<commit_message>
changed script_record_v2.png to script_record.png, keeping only one .png and both figure versions in the powerpoint file
</commit_message>
<xml_diff>
--- a/figures/resources/script_record.pptx
+++ b/figures/resources/script_record.pptx
@@ -7,6 +7,7 @@
   <p:sldIdLst>
     <p:sldId id="256" r:id="rId2"/>
     <p:sldId id="257" r:id="rId3"/>
+    <p:sldId id="259" r:id="rId4"/>
   </p:sldIdLst>
   <p:sldSz cx="12192000" cy="6858000"/>
   <p:notesSz cx="6858000" cy="9144000"/>
@@ -105,6 +106,11 @@
       </a:defRPr>
     </a:lvl9pPr>
   </p:defaultTextStyle>
+  <p:extLst>
+    <p:ext uri="{EFAFB233-063F-42B5-8137-9DF3F51BA10A}">
+      <p15:sldGuideLst xmlns:p15="http://schemas.microsoft.com/office/powerpoint/2012/main"/>
+    </p:ext>
+  </p:extLst>
 </p:presentation>
 </file>
 
@@ -257,7 +263,7 @@
           <a:p>
             <a:fld id="{D5CE8786-68AE-DC46-AFAE-DE7ECF995173}" type="datetimeFigureOut">
               <a:rPr lang="de-DE" smtClean="0"/>
-              <a:t>20.12.21</a:t>
+              <a:t>06.03.2022</a:t>
             </a:fld>
             <a:endParaRPr lang="de-DE"/>
           </a:p>
@@ -457,7 +463,7 @@
           <a:p>
             <a:fld id="{D5CE8786-68AE-DC46-AFAE-DE7ECF995173}" type="datetimeFigureOut">
               <a:rPr lang="de-DE" smtClean="0"/>
-              <a:t>20.12.21</a:t>
+              <a:t>06.03.2022</a:t>
             </a:fld>
             <a:endParaRPr lang="de-DE"/>
           </a:p>
@@ -667,7 +673,7 @@
           <a:p>
             <a:fld id="{D5CE8786-68AE-DC46-AFAE-DE7ECF995173}" type="datetimeFigureOut">
               <a:rPr lang="de-DE" smtClean="0"/>
-              <a:t>20.12.21</a:t>
+              <a:t>06.03.2022</a:t>
             </a:fld>
             <a:endParaRPr lang="de-DE"/>
           </a:p>
@@ -867,7 +873,7 @@
           <a:p>
             <a:fld id="{D5CE8786-68AE-DC46-AFAE-DE7ECF995173}" type="datetimeFigureOut">
               <a:rPr lang="de-DE" smtClean="0"/>
-              <a:t>20.12.21</a:t>
+              <a:t>06.03.2022</a:t>
             </a:fld>
             <a:endParaRPr lang="de-DE"/>
           </a:p>
@@ -1143,7 +1149,7 @@
           <a:p>
             <a:fld id="{D5CE8786-68AE-DC46-AFAE-DE7ECF995173}" type="datetimeFigureOut">
               <a:rPr lang="de-DE" smtClean="0"/>
-              <a:t>20.12.21</a:t>
+              <a:t>06.03.2022</a:t>
             </a:fld>
             <a:endParaRPr lang="de-DE"/>
           </a:p>
@@ -1411,7 +1417,7 @@
           <a:p>
             <a:fld id="{D5CE8786-68AE-DC46-AFAE-DE7ECF995173}" type="datetimeFigureOut">
               <a:rPr lang="de-DE" smtClean="0"/>
-              <a:t>20.12.21</a:t>
+              <a:t>06.03.2022</a:t>
             </a:fld>
             <a:endParaRPr lang="de-DE"/>
           </a:p>
@@ -1826,7 +1832,7 @@
           <a:p>
             <a:fld id="{D5CE8786-68AE-DC46-AFAE-DE7ECF995173}" type="datetimeFigureOut">
               <a:rPr lang="de-DE" smtClean="0"/>
-              <a:t>20.12.21</a:t>
+              <a:t>06.03.2022</a:t>
             </a:fld>
             <a:endParaRPr lang="de-DE"/>
           </a:p>
@@ -1968,7 +1974,7 @@
           <a:p>
             <a:fld id="{D5CE8786-68AE-DC46-AFAE-DE7ECF995173}" type="datetimeFigureOut">
               <a:rPr lang="de-DE" smtClean="0"/>
-              <a:t>20.12.21</a:t>
+              <a:t>06.03.2022</a:t>
             </a:fld>
             <a:endParaRPr lang="de-DE"/>
           </a:p>
@@ -2081,7 +2087,7 @@
           <a:p>
             <a:fld id="{D5CE8786-68AE-DC46-AFAE-DE7ECF995173}" type="datetimeFigureOut">
               <a:rPr lang="de-DE" smtClean="0"/>
-              <a:t>20.12.21</a:t>
+              <a:t>06.03.2022</a:t>
             </a:fld>
             <a:endParaRPr lang="de-DE"/>
           </a:p>
@@ -2394,7 +2400,7 @@
           <a:p>
             <a:fld id="{D5CE8786-68AE-DC46-AFAE-DE7ECF995173}" type="datetimeFigureOut">
               <a:rPr lang="de-DE" smtClean="0"/>
-              <a:t>20.12.21</a:t>
+              <a:t>06.03.2022</a:t>
             </a:fld>
             <a:endParaRPr lang="de-DE"/>
           </a:p>
@@ -2683,7 +2689,7 @@
           <a:p>
             <a:fld id="{D5CE8786-68AE-DC46-AFAE-DE7ECF995173}" type="datetimeFigureOut">
               <a:rPr lang="de-DE" smtClean="0"/>
-              <a:t>20.12.21</a:t>
+              <a:t>06.03.2022</a:t>
             </a:fld>
             <a:endParaRPr lang="de-DE"/>
           </a:p>
@@ -2926,7 +2932,7 @@
           <a:p>
             <a:fld id="{D5CE8786-68AE-DC46-AFAE-DE7ECF995173}" type="datetimeFigureOut">
               <a:rPr lang="de-DE" smtClean="0"/>
-              <a:t>20.12.21</a:t>
+              <a:t>06.03.2022</a:t>
             </a:fld>
             <a:endParaRPr lang="de-DE"/>
           </a:p>
@@ -3529,6 +3535,1174 @@
 </p:sld>
 </file>
 
+<file path=ppt/slides/slide3.xml><?xml version="1.0" encoding="utf-8"?>
+<p:sld xmlns:a="http://schemas.openxmlformats.org/drawingml/2006/main" xmlns:r="http://schemas.openxmlformats.org/officeDocument/2006/relationships" xmlns:p="http://schemas.openxmlformats.org/presentationml/2006/main">
+  <p:cSld>
+    <p:spTree>
+      <p:nvGrpSpPr>
+        <p:cNvPr id="1" name=""/>
+        <p:cNvGrpSpPr/>
+        <p:nvPr/>
+      </p:nvGrpSpPr>
+      <p:grpSpPr>
+        <a:xfrm>
+          <a:off x="0" y="0"/>
+          <a:ext cx="0" cy="0"/>
+          <a:chOff x="0" y="0"/>
+          <a:chExt cx="0" cy="0"/>
+        </a:xfrm>
+      </p:grpSpPr>
+      <p:grpSp>
+        <p:nvGrpSpPr>
+          <p:cNvPr id="19" name="Group 18"/>
+          <p:cNvGrpSpPr/>
+          <p:nvPr/>
+        </p:nvGrpSpPr>
+        <p:grpSpPr>
+          <a:xfrm>
+            <a:off x="1123949" y="1211188"/>
+            <a:ext cx="3727687" cy="1789545"/>
+            <a:chOff x="1358781" y="734938"/>
+            <a:chExt cx="3727687" cy="1789545"/>
+          </a:xfrm>
+        </p:grpSpPr>
+        <p:sp>
+          <p:nvSpPr>
+            <p:cNvPr id="4" name="Rectangle 3"/>
+            <p:cNvSpPr/>
+            <p:nvPr/>
+          </p:nvSpPr>
+          <p:spPr>
+            <a:xfrm>
+              <a:off x="1358781" y="734938"/>
+              <a:ext cx="1841619" cy="264920"/>
+            </a:xfrm>
+            <a:prstGeom prst="rect">
+              <a:avLst/>
+            </a:prstGeom>
+            <a:gradFill flip="none" rotWithShape="1">
+              <a:gsLst>
+                <a:gs pos="0">
+                  <a:schemeClr val="accent3">
+                    <a:lumMod val="5000"/>
+                    <a:lumOff val="95000"/>
+                  </a:schemeClr>
+                </a:gs>
+                <a:gs pos="74000">
+                  <a:schemeClr val="accent3">
+                    <a:lumMod val="45000"/>
+                    <a:lumOff val="55000"/>
+                  </a:schemeClr>
+                </a:gs>
+                <a:gs pos="83000">
+                  <a:schemeClr val="accent3">
+                    <a:lumMod val="45000"/>
+                    <a:lumOff val="55000"/>
+                  </a:schemeClr>
+                </a:gs>
+                <a:gs pos="100000">
+                  <a:schemeClr val="accent3">
+                    <a:lumMod val="30000"/>
+                    <a:lumOff val="70000"/>
+                  </a:schemeClr>
+                </a:gs>
+              </a:gsLst>
+              <a:lin ang="2700000" scaled="1"/>
+              <a:tileRect/>
+            </a:gradFill>
+            <a:ln>
+              <a:solidFill>
+                <a:schemeClr val="bg1">
+                  <a:lumMod val="95000"/>
+                </a:schemeClr>
+              </a:solidFill>
+            </a:ln>
+            <a:scene3d>
+              <a:camera prst="orthographicFront"/>
+              <a:lightRig rig="threePt" dir="t"/>
+            </a:scene3d>
+            <a:sp3d>
+              <a:bevelT w="25400" h="25400"/>
+            </a:sp3d>
+          </p:spPr>
+          <p:style>
+            <a:lnRef idx="0">
+              <a:scrgbClr r="0" g="0" b="0"/>
+            </a:lnRef>
+            <a:fillRef idx="0">
+              <a:scrgbClr r="0" g="0" b="0"/>
+            </a:fillRef>
+            <a:effectRef idx="0">
+              <a:scrgbClr r="0" g="0" b="0"/>
+            </a:effectRef>
+            <a:fontRef idx="minor">
+              <a:schemeClr val="lt1"/>
+            </a:fontRef>
+          </p:style>
+          <p:txBody>
+            <a:bodyPr rtlCol="0" anchor="ctr"/>
+            <a:lstStyle/>
+            <a:p>
+              <a:pPr algn="ctr"/>
+              <a:endParaRPr lang="en-US"/>
+            </a:p>
+          </p:txBody>
+        </p:sp>
+        <p:sp>
+          <p:nvSpPr>
+            <p:cNvPr id="5" name="Rectangle 4"/>
+            <p:cNvSpPr/>
+            <p:nvPr/>
+          </p:nvSpPr>
+          <p:spPr>
+            <a:xfrm>
+              <a:off x="1358781" y="999858"/>
+              <a:ext cx="1841619" cy="264920"/>
+            </a:xfrm>
+            <a:prstGeom prst="rect">
+              <a:avLst/>
+            </a:prstGeom>
+            <a:gradFill flip="none" rotWithShape="1">
+              <a:gsLst>
+                <a:gs pos="0">
+                  <a:schemeClr val="accent3">
+                    <a:lumMod val="5000"/>
+                    <a:lumOff val="95000"/>
+                  </a:schemeClr>
+                </a:gs>
+                <a:gs pos="74000">
+                  <a:schemeClr val="accent3">
+                    <a:lumMod val="45000"/>
+                    <a:lumOff val="55000"/>
+                  </a:schemeClr>
+                </a:gs>
+                <a:gs pos="83000">
+                  <a:schemeClr val="accent3">
+                    <a:lumMod val="45000"/>
+                    <a:lumOff val="55000"/>
+                  </a:schemeClr>
+                </a:gs>
+                <a:gs pos="100000">
+                  <a:schemeClr val="accent3">
+                    <a:lumMod val="30000"/>
+                    <a:lumOff val="70000"/>
+                  </a:schemeClr>
+                </a:gs>
+              </a:gsLst>
+              <a:lin ang="2700000" scaled="1"/>
+              <a:tileRect/>
+            </a:gradFill>
+            <a:ln>
+              <a:solidFill>
+                <a:schemeClr val="bg1">
+                  <a:lumMod val="95000"/>
+                </a:schemeClr>
+              </a:solidFill>
+            </a:ln>
+            <a:scene3d>
+              <a:camera prst="orthographicFront"/>
+              <a:lightRig rig="threePt" dir="t"/>
+            </a:scene3d>
+            <a:sp3d>
+              <a:bevelT w="25400" h="25400"/>
+            </a:sp3d>
+          </p:spPr>
+          <p:style>
+            <a:lnRef idx="0">
+              <a:scrgbClr r="0" g="0" b="0"/>
+            </a:lnRef>
+            <a:fillRef idx="0">
+              <a:scrgbClr r="0" g="0" b="0"/>
+            </a:fillRef>
+            <a:effectRef idx="0">
+              <a:scrgbClr r="0" g="0" b="0"/>
+            </a:effectRef>
+            <a:fontRef idx="minor">
+              <a:schemeClr val="lt1"/>
+            </a:fontRef>
+          </p:style>
+          <p:txBody>
+            <a:bodyPr rtlCol="0" anchor="ctr"/>
+            <a:lstStyle/>
+            <a:p>
+              <a:pPr algn="ctr"/>
+              <a:endParaRPr lang="en-US"/>
+            </a:p>
+          </p:txBody>
+        </p:sp>
+        <p:sp>
+          <p:nvSpPr>
+            <p:cNvPr id="6" name="Rectangle 5"/>
+            <p:cNvSpPr/>
+            <p:nvPr/>
+          </p:nvSpPr>
+          <p:spPr>
+            <a:xfrm>
+              <a:off x="1358781" y="1264778"/>
+              <a:ext cx="1841619" cy="264920"/>
+            </a:xfrm>
+            <a:prstGeom prst="rect">
+              <a:avLst/>
+            </a:prstGeom>
+            <a:gradFill flip="none" rotWithShape="1">
+              <a:gsLst>
+                <a:gs pos="0">
+                  <a:schemeClr val="accent5">
+                    <a:lumMod val="67000"/>
+                  </a:schemeClr>
+                </a:gs>
+                <a:gs pos="48000">
+                  <a:schemeClr val="accent5">
+                    <a:lumMod val="97000"/>
+                    <a:lumOff val="3000"/>
+                  </a:schemeClr>
+                </a:gs>
+                <a:gs pos="100000">
+                  <a:schemeClr val="accent5">
+                    <a:lumMod val="60000"/>
+                    <a:lumOff val="40000"/>
+                  </a:schemeClr>
+                </a:gs>
+              </a:gsLst>
+              <a:lin ang="16200000" scaled="1"/>
+              <a:tileRect/>
+            </a:gradFill>
+            <a:ln>
+              <a:solidFill>
+                <a:schemeClr val="bg1">
+                  <a:lumMod val="95000"/>
+                </a:schemeClr>
+              </a:solidFill>
+            </a:ln>
+            <a:scene3d>
+              <a:camera prst="orthographicFront"/>
+              <a:lightRig rig="threePt" dir="t"/>
+            </a:scene3d>
+            <a:sp3d>
+              <a:bevelT w="25400" h="25400"/>
+            </a:sp3d>
+          </p:spPr>
+          <p:style>
+            <a:lnRef idx="0">
+              <a:scrgbClr r="0" g="0" b="0"/>
+            </a:lnRef>
+            <a:fillRef idx="0">
+              <a:scrgbClr r="0" g="0" b="0"/>
+            </a:fillRef>
+            <a:effectRef idx="0">
+              <a:scrgbClr r="0" g="0" b="0"/>
+            </a:effectRef>
+            <a:fontRef idx="minor">
+              <a:schemeClr val="lt1"/>
+            </a:fontRef>
+          </p:style>
+          <p:txBody>
+            <a:bodyPr rtlCol="0" anchor="ctr"/>
+            <a:lstStyle/>
+            <a:p>
+              <a:pPr algn="ctr"/>
+              <a:endParaRPr lang="en-US"/>
+            </a:p>
+          </p:txBody>
+        </p:sp>
+        <p:sp>
+          <p:nvSpPr>
+            <p:cNvPr id="7" name="Rectangle 6"/>
+            <p:cNvSpPr/>
+            <p:nvPr/>
+          </p:nvSpPr>
+          <p:spPr>
+            <a:xfrm>
+              <a:off x="1358781" y="1529698"/>
+              <a:ext cx="1841619" cy="264920"/>
+            </a:xfrm>
+            <a:prstGeom prst="rect">
+              <a:avLst/>
+            </a:prstGeom>
+            <a:gradFill flip="none" rotWithShape="1">
+              <a:gsLst>
+                <a:gs pos="0">
+                  <a:schemeClr val="accent3">
+                    <a:lumMod val="5000"/>
+                    <a:lumOff val="95000"/>
+                  </a:schemeClr>
+                </a:gs>
+                <a:gs pos="74000">
+                  <a:schemeClr val="accent3">
+                    <a:lumMod val="45000"/>
+                    <a:lumOff val="55000"/>
+                  </a:schemeClr>
+                </a:gs>
+                <a:gs pos="83000">
+                  <a:schemeClr val="accent3">
+                    <a:lumMod val="45000"/>
+                    <a:lumOff val="55000"/>
+                  </a:schemeClr>
+                </a:gs>
+                <a:gs pos="100000">
+                  <a:schemeClr val="accent3">
+                    <a:lumMod val="30000"/>
+                    <a:lumOff val="70000"/>
+                  </a:schemeClr>
+                </a:gs>
+              </a:gsLst>
+              <a:lin ang="2700000" scaled="1"/>
+              <a:tileRect/>
+            </a:gradFill>
+            <a:ln>
+              <a:solidFill>
+                <a:schemeClr val="bg1">
+                  <a:lumMod val="95000"/>
+                </a:schemeClr>
+              </a:solidFill>
+            </a:ln>
+            <a:scene3d>
+              <a:camera prst="orthographicFront"/>
+              <a:lightRig rig="threePt" dir="t"/>
+            </a:scene3d>
+            <a:sp3d>
+              <a:bevelT w="25400" h="25400"/>
+            </a:sp3d>
+          </p:spPr>
+          <p:style>
+            <a:lnRef idx="0">
+              <a:scrgbClr r="0" g="0" b="0"/>
+            </a:lnRef>
+            <a:fillRef idx="0">
+              <a:scrgbClr r="0" g="0" b="0"/>
+            </a:fillRef>
+            <a:effectRef idx="0">
+              <a:scrgbClr r="0" g="0" b="0"/>
+            </a:effectRef>
+            <a:fontRef idx="minor">
+              <a:schemeClr val="lt1"/>
+            </a:fontRef>
+          </p:style>
+          <p:txBody>
+            <a:bodyPr rtlCol="0" anchor="ctr"/>
+            <a:lstStyle/>
+            <a:p>
+              <a:pPr algn="ctr"/>
+              <a:endParaRPr lang="en-US"/>
+            </a:p>
+          </p:txBody>
+        </p:sp>
+        <p:sp>
+          <p:nvSpPr>
+            <p:cNvPr id="8" name="Rectangle 7"/>
+            <p:cNvSpPr/>
+            <p:nvPr/>
+          </p:nvSpPr>
+          <p:spPr>
+            <a:xfrm>
+              <a:off x="3200400" y="1264778"/>
+              <a:ext cx="1841619" cy="264920"/>
+            </a:xfrm>
+            <a:prstGeom prst="rect">
+              <a:avLst/>
+            </a:prstGeom>
+            <a:gradFill flip="none" rotWithShape="1">
+              <a:gsLst>
+                <a:gs pos="0">
+                  <a:schemeClr val="accent3">
+                    <a:lumMod val="5000"/>
+                    <a:lumOff val="95000"/>
+                  </a:schemeClr>
+                </a:gs>
+                <a:gs pos="74000">
+                  <a:schemeClr val="accent3">
+                    <a:lumMod val="45000"/>
+                    <a:lumOff val="55000"/>
+                  </a:schemeClr>
+                </a:gs>
+                <a:gs pos="83000">
+                  <a:schemeClr val="accent3">
+                    <a:lumMod val="45000"/>
+                    <a:lumOff val="55000"/>
+                  </a:schemeClr>
+                </a:gs>
+                <a:gs pos="100000">
+                  <a:schemeClr val="accent3">
+                    <a:lumMod val="30000"/>
+                    <a:lumOff val="70000"/>
+                  </a:schemeClr>
+                </a:gs>
+              </a:gsLst>
+              <a:lin ang="2700000" scaled="1"/>
+              <a:tileRect/>
+            </a:gradFill>
+            <a:ln>
+              <a:solidFill>
+                <a:schemeClr val="bg1">
+                  <a:lumMod val="95000"/>
+                </a:schemeClr>
+              </a:solidFill>
+            </a:ln>
+            <a:scene3d>
+              <a:camera prst="orthographicFront"/>
+              <a:lightRig rig="threePt" dir="t"/>
+            </a:scene3d>
+            <a:sp3d>
+              <a:bevelT w="25400" h="25400"/>
+            </a:sp3d>
+          </p:spPr>
+          <p:style>
+            <a:lnRef idx="0">
+              <a:scrgbClr r="0" g="0" b="0"/>
+            </a:lnRef>
+            <a:fillRef idx="0">
+              <a:scrgbClr r="0" g="0" b="0"/>
+            </a:fillRef>
+            <a:effectRef idx="0">
+              <a:scrgbClr r="0" g="0" b="0"/>
+            </a:effectRef>
+            <a:fontRef idx="minor">
+              <a:schemeClr val="lt1"/>
+            </a:fontRef>
+          </p:style>
+          <p:txBody>
+            <a:bodyPr rtlCol="0" anchor="ctr"/>
+            <a:lstStyle/>
+            <a:p>
+              <a:pPr algn="ctr"/>
+              <a:endParaRPr lang="en-US"/>
+            </a:p>
+          </p:txBody>
+        </p:sp>
+        <p:sp>
+          <p:nvSpPr>
+            <p:cNvPr id="9" name="Rectangle 8"/>
+            <p:cNvSpPr/>
+            <p:nvPr/>
+          </p:nvSpPr>
+          <p:spPr>
+            <a:xfrm>
+              <a:off x="3200400" y="1529698"/>
+              <a:ext cx="1841619" cy="264920"/>
+            </a:xfrm>
+            <a:prstGeom prst="rect">
+              <a:avLst/>
+            </a:prstGeom>
+            <a:gradFill flip="none" rotWithShape="1">
+              <a:gsLst>
+                <a:gs pos="0">
+                  <a:schemeClr val="accent3">
+                    <a:lumMod val="5000"/>
+                    <a:lumOff val="95000"/>
+                  </a:schemeClr>
+                </a:gs>
+                <a:gs pos="74000">
+                  <a:schemeClr val="accent3">
+                    <a:lumMod val="45000"/>
+                    <a:lumOff val="55000"/>
+                  </a:schemeClr>
+                </a:gs>
+                <a:gs pos="83000">
+                  <a:schemeClr val="accent3">
+                    <a:lumMod val="45000"/>
+                    <a:lumOff val="55000"/>
+                  </a:schemeClr>
+                </a:gs>
+                <a:gs pos="100000">
+                  <a:schemeClr val="accent3">
+                    <a:lumMod val="30000"/>
+                    <a:lumOff val="70000"/>
+                  </a:schemeClr>
+                </a:gs>
+              </a:gsLst>
+              <a:lin ang="2700000" scaled="1"/>
+              <a:tileRect/>
+            </a:gradFill>
+            <a:ln>
+              <a:solidFill>
+                <a:schemeClr val="bg1">
+                  <a:lumMod val="95000"/>
+                </a:schemeClr>
+              </a:solidFill>
+            </a:ln>
+            <a:scene3d>
+              <a:camera prst="orthographicFront"/>
+              <a:lightRig rig="threePt" dir="t"/>
+            </a:scene3d>
+            <a:sp3d>
+              <a:bevelT w="25400" h="25400"/>
+            </a:sp3d>
+          </p:spPr>
+          <p:style>
+            <a:lnRef idx="0">
+              <a:scrgbClr r="0" g="0" b="0"/>
+            </a:lnRef>
+            <a:fillRef idx="0">
+              <a:scrgbClr r="0" g="0" b="0"/>
+            </a:fillRef>
+            <a:effectRef idx="0">
+              <a:scrgbClr r="0" g="0" b="0"/>
+            </a:effectRef>
+            <a:fontRef idx="minor">
+              <a:schemeClr val="lt1"/>
+            </a:fontRef>
+          </p:style>
+          <p:txBody>
+            <a:bodyPr rtlCol="0" anchor="ctr"/>
+            <a:lstStyle/>
+            <a:p>
+              <a:pPr algn="ctr"/>
+              <a:endParaRPr lang="en-US"/>
+            </a:p>
+          </p:txBody>
+        </p:sp>
+        <p:sp>
+          <p:nvSpPr>
+            <p:cNvPr id="10" name="Rectangle 9"/>
+            <p:cNvSpPr/>
+            <p:nvPr/>
+          </p:nvSpPr>
+          <p:spPr>
+            <a:xfrm>
+              <a:off x="3200399" y="2059538"/>
+              <a:ext cx="1841619" cy="264920"/>
+            </a:xfrm>
+            <a:prstGeom prst="rect">
+              <a:avLst/>
+            </a:prstGeom>
+            <a:gradFill flip="none" rotWithShape="1">
+              <a:gsLst>
+                <a:gs pos="0">
+                  <a:schemeClr val="accent5">
+                    <a:lumMod val="67000"/>
+                  </a:schemeClr>
+                </a:gs>
+                <a:gs pos="48000">
+                  <a:schemeClr val="accent5">
+                    <a:lumMod val="97000"/>
+                    <a:lumOff val="3000"/>
+                  </a:schemeClr>
+                </a:gs>
+                <a:gs pos="100000">
+                  <a:schemeClr val="accent5">
+                    <a:lumMod val="60000"/>
+                    <a:lumOff val="40000"/>
+                  </a:schemeClr>
+                </a:gs>
+              </a:gsLst>
+              <a:lin ang="16200000" scaled="1"/>
+              <a:tileRect/>
+            </a:gradFill>
+            <a:ln>
+              <a:solidFill>
+                <a:schemeClr val="bg1">
+                  <a:lumMod val="95000"/>
+                </a:schemeClr>
+              </a:solidFill>
+            </a:ln>
+            <a:scene3d>
+              <a:camera prst="orthographicFront"/>
+              <a:lightRig rig="threePt" dir="t"/>
+            </a:scene3d>
+            <a:sp3d>
+              <a:bevelT w="25400" h="25400"/>
+            </a:sp3d>
+          </p:spPr>
+          <p:style>
+            <a:lnRef idx="0">
+              <a:scrgbClr r="0" g="0" b="0"/>
+            </a:lnRef>
+            <a:fillRef idx="0">
+              <a:scrgbClr r="0" g="0" b="0"/>
+            </a:fillRef>
+            <a:effectRef idx="0">
+              <a:scrgbClr r="0" g="0" b="0"/>
+            </a:effectRef>
+            <a:fontRef idx="minor">
+              <a:schemeClr val="lt1"/>
+            </a:fontRef>
+          </p:style>
+          <p:txBody>
+            <a:bodyPr rtlCol="0" anchor="ctr"/>
+            <a:lstStyle/>
+            <a:p>
+              <a:pPr algn="ctr"/>
+              <a:r>
+                <a:rPr lang="nl-NL" dirty="0" smtClean="0"/>
+                <a:t>GaussianBlur</a:t>
+              </a:r>
+              <a:endParaRPr lang="en-US" dirty="0"/>
+            </a:p>
+          </p:txBody>
+        </p:sp>
+        <p:sp>
+          <p:nvSpPr>
+            <p:cNvPr id="11" name="Rectangle 10"/>
+            <p:cNvSpPr/>
+            <p:nvPr/>
+          </p:nvSpPr>
+          <p:spPr>
+            <a:xfrm>
+              <a:off x="3200400" y="1794618"/>
+              <a:ext cx="1841619" cy="264920"/>
+            </a:xfrm>
+            <a:prstGeom prst="rect">
+              <a:avLst/>
+            </a:prstGeom>
+            <a:gradFill flip="none" rotWithShape="1">
+              <a:gsLst>
+                <a:gs pos="0">
+                  <a:schemeClr val="accent3">
+                    <a:lumMod val="5000"/>
+                    <a:lumOff val="95000"/>
+                  </a:schemeClr>
+                </a:gs>
+                <a:gs pos="74000">
+                  <a:schemeClr val="accent3">
+                    <a:lumMod val="45000"/>
+                    <a:lumOff val="55000"/>
+                  </a:schemeClr>
+                </a:gs>
+                <a:gs pos="83000">
+                  <a:schemeClr val="accent3">
+                    <a:lumMod val="45000"/>
+                    <a:lumOff val="55000"/>
+                  </a:schemeClr>
+                </a:gs>
+                <a:gs pos="100000">
+                  <a:schemeClr val="accent3">
+                    <a:lumMod val="30000"/>
+                    <a:lumOff val="70000"/>
+                  </a:schemeClr>
+                </a:gs>
+              </a:gsLst>
+              <a:lin ang="2700000" scaled="1"/>
+              <a:tileRect/>
+            </a:gradFill>
+            <a:ln>
+              <a:solidFill>
+                <a:schemeClr val="bg1">
+                  <a:lumMod val="95000"/>
+                </a:schemeClr>
+              </a:solidFill>
+            </a:ln>
+            <a:scene3d>
+              <a:camera prst="orthographicFront"/>
+              <a:lightRig rig="threePt" dir="t"/>
+            </a:scene3d>
+            <a:sp3d>
+              <a:bevelT w="25400" h="25400"/>
+            </a:sp3d>
+          </p:spPr>
+          <p:style>
+            <a:lnRef idx="0">
+              <a:scrgbClr r="0" g="0" b="0"/>
+            </a:lnRef>
+            <a:fillRef idx="0">
+              <a:scrgbClr r="0" g="0" b="0"/>
+            </a:fillRef>
+            <a:effectRef idx="0">
+              <a:scrgbClr r="0" g="0" b="0"/>
+            </a:effectRef>
+            <a:fontRef idx="minor">
+              <a:schemeClr val="lt1"/>
+            </a:fontRef>
+          </p:style>
+          <p:txBody>
+            <a:bodyPr rtlCol="0" anchor="ctr"/>
+            <a:lstStyle/>
+            <a:p>
+              <a:pPr algn="ctr"/>
+              <a:endParaRPr lang="en-US"/>
+            </a:p>
+          </p:txBody>
+        </p:sp>
+        <p:sp>
+          <p:nvSpPr>
+            <p:cNvPr id="14" name="Freeform 13"/>
+            <p:cNvSpPr/>
+            <p:nvPr/>
+          </p:nvSpPr>
+          <p:spPr>
+            <a:xfrm>
+              <a:off x="4832468" y="2124433"/>
+              <a:ext cx="254000" cy="400050"/>
+            </a:xfrm>
+            <a:custGeom>
+              <a:avLst/>
+              <a:gdLst>
+                <a:gd name="connsiteX0" fmla="*/ 0 w 241300"/>
+                <a:gd name="connsiteY0" fmla="*/ 0 h 400050"/>
+                <a:gd name="connsiteX1" fmla="*/ 0 w 241300"/>
+                <a:gd name="connsiteY1" fmla="*/ 346075 h 400050"/>
+                <a:gd name="connsiteX2" fmla="*/ 79375 w 241300"/>
+                <a:gd name="connsiteY2" fmla="*/ 292100 h 400050"/>
+                <a:gd name="connsiteX3" fmla="*/ 139700 w 241300"/>
+                <a:gd name="connsiteY3" fmla="*/ 400050 h 400050"/>
+                <a:gd name="connsiteX4" fmla="*/ 215900 w 241300"/>
+                <a:gd name="connsiteY4" fmla="*/ 365125 h 400050"/>
+                <a:gd name="connsiteX5" fmla="*/ 152400 w 241300"/>
+                <a:gd name="connsiteY5" fmla="*/ 250825 h 400050"/>
+                <a:gd name="connsiteX6" fmla="*/ 241300 w 241300"/>
+                <a:gd name="connsiteY6" fmla="*/ 247650 h 400050"/>
+                <a:gd name="connsiteX7" fmla="*/ 0 w 241300"/>
+                <a:gd name="connsiteY7" fmla="*/ 0 h 400050"/>
+                <a:gd name="connsiteX0" fmla="*/ 0 w 254000"/>
+                <a:gd name="connsiteY0" fmla="*/ 0 h 400050"/>
+                <a:gd name="connsiteX1" fmla="*/ 0 w 254000"/>
+                <a:gd name="connsiteY1" fmla="*/ 346075 h 400050"/>
+                <a:gd name="connsiteX2" fmla="*/ 79375 w 254000"/>
+                <a:gd name="connsiteY2" fmla="*/ 292100 h 400050"/>
+                <a:gd name="connsiteX3" fmla="*/ 139700 w 254000"/>
+                <a:gd name="connsiteY3" fmla="*/ 400050 h 400050"/>
+                <a:gd name="connsiteX4" fmla="*/ 215900 w 254000"/>
+                <a:gd name="connsiteY4" fmla="*/ 365125 h 400050"/>
+                <a:gd name="connsiteX5" fmla="*/ 152400 w 254000"/>
+                <a:gd name="connsiteY5" fmla="*/ 250825 h 400050"/>
+                <a:gd name="connsiteX6" fmla="*/ 254000 w 254000"/>
+                <a:gd name="connsiteY6" fmla="*/ 228600 h 400050"/>
+                <a:gd name="connsiteX7" fmla="*/ 0 w 254000"/>
+                <a:gd name="connsiteY7" fmla="*/ 0 h 400050"/>
+              </a:gdLst>
+              <a:ahLst/>
+              <a:cxnLst>
+                <a:cxn ang="0">
+                  <a:pos x="connsiteX0" y="connsiteY0"/>
+                </a:cxn>
+                <a:cxn ang="0">
+                  <a:pos x="connsiteX1" y="connsiteY1"/>
+                </a:cxn>
+                <a:cxn ang="0">
+                  <a:pos x="connsiteX2" y="connsiteY2"/>
+                </a:cxn>
+                <a:cxn ang="0">
+                  <a:pos x="connsiteX3" y="connsiteY3"/>
+                </a:cxn>
+                <a:cxn ang="0">
+                  <a:pos x="connsiteX4" y="connsiteY4"/>
+                </a:cxn>
+                <a:cxn ang="0">
+                  <a:pos x="connsiteX5" y="connsiteY5"/>
+                </a:cxn>
+                <a:cxn ang="0">
+                  <a:pos x="connsiteX6" y="connsiteY6"/>
+                </a:cxn>
+                <a:cxn ang="0">
+                  <a:pos x="connsiteX7" y="connsiteY7"/>
+                </a:cxn>
+              </a:cxnLst>
+              <a:rect l="l" t="t" r="r" b="b"/>
+              <a:pathLst>
+                <a:path w="254000" h="400050">
+                  <a:moveTo>
+                    <a:pt x="0" y="0"/>
+                  </a:moveTo>
+                  <a:lnTo>
+                    <a:pt x="0" y="346075"/>
+                  </a:lnTo>
+                  <a:lnTo>
+                    <a:pt x="79375" y="292100"/>
+                  </a:lnTo>
+                  <a:lnTo>
+                    <a:pt x="139700" y="400050"/>
+                  </a:lnTo>
+                  <a:lnTo>
+                    <a:pt x="215900" y="365125"/>
+                  </a:lnTo>
+                  <a:lnTo>
+                    <a:pt x="152400" y="250825"/>
+                  </a:lnTo>
+                  <a:lnTo>
+                    <a:pt x="254000" y="228600"/>
+                  </a:lnTo>
+                  <a:lnTo>
+                    <a:pt x="0" y="0"/>
+                  </a:lnTo>
+                  <a:close/>
+                </a:path>
+              </a:pathLst>
+            </a:custGeom>
+            <a:solidFill>
+              <a:schemeClr val="bg1"/>
+            </a:solidFill>
+            <a:ln>
+              <a:solidFill>
+                <a:schemeClr val="tx1"/>
+              </a:solidFill>
+            </a:ln>
+          </p:spPr>
+          <p:style>
+            <a:lnRef idx="2">
+              <a:schemeClr val="accent1">
+                <a:shade val="50000"/>
+              </a:schemeClr>
+            </a:lnRef>
+            <a:fillRef idx="1">
+              <a:schemeClr val="accent1"/>
+            </a:fillRef>
+            <a:effectRef idx="0">
+              <a:schemeClr val="accent1"/>
+            </a:effectRef>
+            <a:fontRef idx="minor">
+              <a:schemeClr val="lt1"/>
+            </a:fontRef>
+          </p:style>
+          <p:txBody>
+            <a:bodyPr rtlCol="0" anchor="ctr"/>
+            <a:lstStyle/>
+            <a:p>
+              <a:pPr algn="ctr"/>
+              <a:endParaRPr lang="en-US"/>
+            </a:p>
+          </p:txBody>
+        </p:sp>
+      </p:grpSp>
+      <p:pic>
+        <p:nvPicPr>
+          <p:cNvPr id="15" name="Picture 14"/>
+          <p:cNvPicPr>
+            <a:picLocks noChangeAspect="1"/>
+          </p:cNvPicPr>
+          <p:nvPr/>
+        </p:nvPicPr>
+        <p:blipFill>
+          <a:blip r:embed="rId2"/>
+          <a:stretch>
+            <a:fillRect/>
+          </a:stretch>
+        </p:blipFill>
+        <p:spPr>
+          <a:xfrm>
+            <a:off x="823912" y="3824287"/>
+            <a:ext cx="1971675" cy="1971675"/>
+          </a:xfrm>
+          <a:prstGeom prst="rect">
+            <a:avLst/>
+          </a:prstGeom>
+        </p:spPr>
+      </p:pic>
+      <p:pic>
+        <p:nvPicPr>
+          <p:cNvPr id="16" name="Picture 15"/>
+          <p:cNvPicPr>
+            <a:picLocks noChangeAspect="1"/>
+          </p:cNvPicPr>
+          <p:nvPr/>
+        </p:nvPicPr>
+        <p:blipFill>
+          <a:blip r:embed="rId3"/>
+          <a:stretch>
+            <a:fillRect/>
+          </a:stretch>
+        </p:blipFill>
+        <p:spPr>
+          <a:xfrm>
+            <a:off x="2987793" y="3824286"/>
+            <a:ext cx="1971675" cy="1971675"/>
+          </a:xfrm>
+          <a:prstGeom prst="rect">
+            <a:avLst/>
+          </a:prstGeom>
+        </p:spPr>
+      </p:pic>
+      <p:sp>
+        <p:nvSpPr>
+          <p:cNvPr id="17" name="TextBox 16"/>
+          <p:cNvSpPr txBox="1"/>
+          <p:nvPr/>
+        </p:nvSpPr>
+        <p:spPr>
+          <a:xfrm>
+            <a:off x="1155724" y="3374701"/>
+            <a:ext cx="1308050" cy="369332"/>
+          </a:xfrm>
+          <a:prstGeom prst="rect">
+            <a:avLst/>
+          </a:prstGeom>
+          <a:noFill/>
+        </p:spPr>
+        <p:txBody>
+          <a:bodyPr wrap="none" rtlCol="0">
+            <a:spAutoFit/>
+          </a:bodyPr>
+          <a:lstStyle/>
+          <a:p>
+            <a:r>
+              <a:rPr lang="nl-NL" dirty="0" smtClean="0"/>
+              <a:t>Input image</a:t>
+            </a:r>
+            <a:endParaRPr lang="en-US" dirty="0"/>
+          </a:p>
+        </p:txBody>
+      </p:sp>
+      <p:sp>
+        <p:nvSpPr>
+          <p:cNvPr id="18" name="TextBox 17"/>
+          <p:cNvSpPr txBox="1"/>
+          <p:nvPr/>
+        </p:nvSpPr>
+        <p:spPr>
+          <a:xfrm>
+            <a:off x="3241614" y="3374701"/>
+            <a:ext cx="1502206" cy="369332"/>
+          </a:xfrm>
+          <a:prstGeom prst="rect">
+            <a:avLst/>
+          </a:prstGeom>
+          <a:noFill/>
+        </p:spPr>
+        <p:txBody>
+          <a:bodyPr wrap="none" rtlCol="0">
+            <a:spAutoFit/>
+          </a:bodyPr>
+          <a:lstStyle/>
+          <a:p>
+            <a:r>
+              <a:rPr lang="nl-NL" dirty="0" smtClean="0"/>
+              <a:t>Blurred image</a:t>
+            </a:r>
+            <a:endParaRPr lang="en-US" dirty="0"/>
+          </a:p>
+        </p:txBody>
+      </p:sp>
+      <p:sp>
+        <p:nvSpPr>
+          <p:cNvPr id="20" name="TextBox 19"/>
+          <p:cNvSpPr txBox="1"/>
+          <p:nvPr/>
+        </p:nvSpPr>
+        <p:spPr>
+          <a:xfrm>
+            <a:off x="1970689" y="675241"/>
+            <a:ext cx="2541850" cy="369332"/>
+          </a:xfrm>
+          <a:prstGeom prst="rect">
+            <a:avLst/>
+          </a:prstGeom>
+          <a:noFill/>
+        </p:spPr>
+        <p:txBody>
+          <a:bodyPr wrap="none" rtlCol="0">
+            <a:spAutoFit/>
+          </a:bodyPr>
+          <a:lstStyle/>
+          <a:p>
+            <a:r>
+              <a:rPr lang="nl-NL" dirty="0" smtClean="0"/>
+              <a:t>Image analysis in the GUI</a:t>
+            </a:r>
+            <a:endParaRPr lang="en-US" dirty="0"/>
+          </a:p>
+        </p:txBody>
+      </p:sp>
+      <p:sp>
+        <p:nvSpPr>
+          <p:cNvPr id="21" name="TextBox 20"/>
+          <p:cNvSpPr txBox="1"/>
+          <p:nvPr/>
+        </p:nvSpPr>
+        <p:spPr>
+          <a:xfrm>
+            <a:off x="6648805" y="2000033"/>
+            <a:ext cx="4210961" cy="369332"/>
+          </a:xfrm>
+          <a:prstGeom prst="rect">
+            <a:avLst/>
+          </a:prstGeom>
+          <a:noFill/>
+        </p:spPr>
+        <p:txBody>
+          <a:bodyPr wrap="none" rtlCol="0">
+            <a:spAutoFit/>
+          </a:bodyPr>
+          <a:lstStyle/>
+          <a:p>
+            <a:r>
+              <a:rPr lang="nl-NL" dirty="0" smtClean="0"/>
+              <a:t>Blurred image = GaussianBlur(Input image)</a:t>
+            </a:r>
+            <a:endParaRPr lang="en-US" dirty="0"/>
+          </a:p>
+        </p:txBody>
+      </p:sp>
+      <p:sp>
+        <p:nvSpPr>
+          <p:cNvPr id="22" name="Rectangle 21"/>
+          <p:cNvSpPr/>
+          <p:nvPr/>
+        </p:nvSpPr>
+        <p:spPr>
+          <a:xfrm>
+            <a:off x="6648805" y="1619512"/>
+            <a:ext cx="4552950" cy="1418338"/>
+          </a:xfrm>
+          <a:prstGeom prst="rect">
+            <a:avLst/>
+          </a:prstGeom>
+          <a:noFill/>
+          <a:ln>
+            <a:solidFill>
+              <a:schemeClr val="tx1"/>
+            </a:solidFill>
+          </a:ln>
+        </p:spPr>
+        <p:style>
+          <a:lnRef idx="2">
+            <a:schemeClr val="accent1">
+              <a:shade val="50000"/>
+            </a:schemeClr>
+          </a:lnRef>
+          <a:fillRef idx="1">
+            <a:schemeClr val="accent1"/>
+          </a:fillRef>
+          <a:effectRef idx="0">
+            <a:schemeClr val="accent1"/>
+          </a:effectRef>
+          <a:fontRef idx="minor">
+            <a:schemeClr val="lt1"/>
+          </a:fontRef>
+        </p:style>
+        <p:txBody>
+          <a:bodyPr rtlCol="0" anchor="ctr"/>
+          <a:lstStyle/>
+          <a:p>
+            <a:pPr algn="ctr"/>
+            <a:endParaRPr lang="en-US"/>
+          </a:p>
+        </p:txBody>
+      </p:sp>
+      <p:sp>
+        <p:nvSpPr>
+          <p:cNvPr id="24" name="Rectangle 23"/>
+          <p:cNvSpPr/>
+          <p:nvPr/>
+        </p:nvSpPr>
+        <p:spPr>
+          <a:xfrm>
+            <a:off x="6648805" y="1343648"/>
+            <a:ext cx="4552950" cy="264920"/>
+          </a:xfrm>
+          <a:prstGeom prst="rect">
+            <a:avLst/>
+          </a:prstGeom>
+          <a:gradFill flip="none" rotWithShape="1">
+            <a:gsLst>
+              <a:gs pos="0">
+                <a:schemeClr val="accent3">
+                  <a:lumMod val="5000"/>
+                  <a:lumOff val="95000"/>
+                </a:schemeClr>
+              </a:gs>
+              <a:gs pos="74000">
+                <a:schemeClr val="accent3">
+                  <a:lumMod val="45000"/>
+                  <a:lumOff val="55000"/>
+                </a:schemeClr>
+              </a:gs>
+              <a:gs pos="83000">
+                <a:schemeClr val="accent3">
+                  <a:lumMod val="45000"/>
+                  <a:lumOff val="55000"/>
+                </a:schemeClr>
+              </a:gs>
+              <a:gs pos="100000">
+                <a:schemeClr val="accent3">
+                  <a:lumMod val="30000"/>
+                  <a:lumOff val="70000"/>
+                </a:schemeClr>
+              </a:gs>
+            </a:gsLst>
+            <a:lin ang="2700000" scaled="1"/>
+            <a:tileRect/>
+          </a:gradFill>
+          <a:ln>
+            <a:solidFill>
+              <a:schemeClr val="bg1">
+                <a:lumMod val="95000"/>
+              </a:schemeClr>
+            </a:solidFill>
+          </a:ln>
+          <a:scene3d>
+            <a:camera prst="orthographicFront"/>
+            <a:lightRig rig="threePt" dir="t"/>
+          </a:scene3d>
+          <a:sp3d>
+            <a:bevelT w="25400" h="25400"/>
+          </a:sp3d>
+        </p:spPr>
+        <p:style>
+          <a:lnRef idx="0">
+            <a:scrgbClr r="0" g="0" b="0"/>
+          </a:lnRef>
+          <a:fillRef idx="0">
+            <a:scrgbClr r="0" g="0" b="0"/>
+          </a:fillRef>
+          <a:effectRef idx="0">
+            <a:scrgbClr r="0" g="0" b="0"/>
+          </a:effectRef>
+          <a:fontRef idx="minor">
+            <a:schemeClr val="lt1"/>
+          </a:fontRef>
+        </p:style>
+        <p:txBody>
+          <a:bodyPr rtlCol="0" anchor="ctr"/>
+          <a:lstStyle/>
+          <a:p>
+            <a:pPr algn="ctr"/>
+            <a:r>
+              <a:rPr lang="nl-NL" dirty="0" smtClean="0">
+                <a:solidFill>
+                  <a:sysClr val="windowText" lastClr="000000"/>
+                </a:solidFill>
+              </a:rPr>
+              <a:t>Script recorder</a:t>
+            </a:r>
+            <a:endParaRPr lang="en-US" dirty="0">
+              <a:solidFill>
+                <a:sysClr val="windowText" lastClr="000000"/>
+              </a:solidFill>
+            </a:endParaRPr>
+          </a:p>
+        </p:txBody>
+      </p:sp>
+      <p:sp>
+        <p:nvSpPr>
+          <p:cNvPr id="26" name="TextBox 25"/>
+          <p:cNvSpPr txBox="1"/>
+          <p:nvPr/>
+        </p:nvSpPr>
+        <p:spPr>
+          <a:xfrm>
+            <a:off x="6648805" y="581695"/>
+            <a:ext cx="4585999" cy="369332"/>
+          </a:xfrm>
+          <a:prstGeom prst="rect">
+            <a:avLst/>
+          </a:prstGeom>
+          <a:noFill/>
+        </p:spPr>
+        <p:txBody>
+          <a:bodyPr wrap="none" rtlCol="0">
+            <a:spAutoFit/>
+          </a:bodyPr>
+          <a:lstStyle/>
+          <a:p>
+            <a:r>
+              <a:rPr lang="nl-NL" dirty="0" smtClean="0"/>
+              <a:t>Manual actions are recorded by script recorder</a:t>
+            </a:r>
+            <a:endParaRPr lang="en-US" dirty="0"/>
+          </a:p>
+        </p:txBody>
+      </p:sp>
+    </p:spTree>
+    <p:extLst>
+      <p:ext uri="{BB962C8B-B14F-4D97-AF65-F5344CB8AC3E}">
+        <p14:creationId xmlns:p14="http://schemas.microsoft.com/office/powerpoint/2010/main" val="3510026632"/>
+      </p:ext>
+    </p:extLst>
+  </p:cSld>
+  <p:clrMapOvr>
+    <a:masterClrMapping/>
+  </p:clrMapOvr>
+</p:sld>
+</file>
+
 <file path=ppt/theme/theme1.xml><?xml version="1.0" encoding="utf-8"?>
 <a:theme xmlns:a="http://schemas.openxmlformats.org/drawingml/2006/main" name="Office Theme">
   <a:themeElements>

</xml_diff>